<commit_message>
Update identifier and include file structure images
</commit_message>
<xml_diff>
--- a/documentation/docs/user-guide/images/Identifiers.pptx
+++ b/documentation/docs/user-guide/images/Identifiers.pptx
@@ -9,7 +9,7 @@
     <p:sldMasterId id="2147483675" r:id="rId8"/>
   </p:sldMasterIdLst>
   <p:notesMasterIdLst>
-    <p:notesMasterId r:id="rId15"/>
+    <p:notesMasterId r:id="rId16"/>
   </p:notesMasterIdLst>
   <p:sldIdLst>
     <p:sldId id="256" r:id="rId9"/>
@@ -17,7 +17,8 @@
     <p:sldId id="1155" r:id="rId11"/>
     <p:sldId id="1157" r:id="rId12"/>
     <p:sldId id="1158" r:id="rId13"/>
-    <p:sldId id="262" r:id="rId14"/>
+    <p:sldId id="1159" r:id="rId14"/>
+    <p:sldId id="262" r:id="rId15"/>
   </p:sldIdLst>
   <p:sldSz cx="12192000" cy="6858000"/>
   <p:notesSz cx="6858000" cy="9144000"/>
@@ -130,6 +131,7 @@
             <p14:sldId id="1155"/>
             <p14:sldId id="1157"/>
             <p14:sldId id="1158"/>
+            <p14:sldId id="1159"/>
           </p14:sldIdLst>
         </p14:section>
         <p14:section name="Last page" id="{9F435845-3AAD-EC43-BE19-1D58D4DE1C66}">
@@ -253,7 +255,7 @@
           <a:p>
             <a:fld id="{F26B8530-A13F-0D40-B555-BA2DA007EB4C}" type="datetimeFigureOut">
               <a:rPr lang="nl-NL" smtClean="0"/>
-              <a:t>7-10-2019</a:t>
+              <a:t>18-2-2020</a:t>
             </a:fld>
             <a:endParaRPr lang="nl-NL"/>
           </a:p>
@@ -654,6 +656,90 @@
     <p:extLst>
       <p:ext uri="{BB962C8B-B14F-4D97-AF65-F5344CB8AC3E}">
         <p14:creationId xmlns:p14="http://schemas.microsoft.com/office/powerpoint/2010/main" val="1660045657"/>
+      </p:ext>
+    </p:extLst>
+  </p:cSld>
+  <p:clrMapOvr>
+    <a:masterClrMapping/>
+  </p:clrMapOvr>
+</p:notes>
+</file>
+
+<file path=ppt/notesSlides/notesSlide3.xml><?xml version="1.0" encoding="utf-8"?>
+<p:notes xmlns:a="http://schemas.openxmlformats.org/drawingml/2006/main" xmlns:r="http://schemas.openxmlformats.org/officeDocument/2006/relationships" xmlns:p="http://schemas.openxmlformats.org/presentationml/2006/main">
+  <p:cSld>
+    <p:spTree>
+      <p:nvGrpSpPr>
+        <p:cNvPr id="1" name=""/>
+        <p:cNvGrpSpPr/>
+        <p:nvPr/>
+      </p:nvGrpSpPr>
+      <p:grpSpPr>
+        <a:xfrm>
+          <a:off x="0" y="0"/>
+          <a:ext cx="0" cy="0"/>
+          <a:chOff x="0" y="0"/>
+          <a:chExt cx="0" cy="0"/>
+        </a:xfrm>
+      </p:grpSpPr>
+      <p:sp>
+        <p:nvSpPr>
+          <p:cNvPr id="2" name="Slide Image Placeholder 1"/>
+          <p:cNvSpPr>
+            <a:spLocks noGrp="1" noRot="1" noChangeAspect="1"/>
+          </p:cNvSpPr>
+          <p:nvPr>
+            <p:ph type="sldImg"/>
+          </p:nvPr>
+        </p:nvSpPr>
+        <p:spPr/>
+      </p:sp>
+      <p:sp>
+        <p:nvSpPr>
+          <p:cNvPr id="3" name="Notes Placeholder 2"/>
+          <p:cNvSpPr>
+            <a:spLocks noGrp="1"/>
+          </p:cNvSpPr>
+          <p:nvPr>
+            <p:ph type="body" idx="1"/>
+          </p:nvPr>
+        </p:nvSpPr>
+        <p:spPr/>
+        <p:txBody>
+          <a:bodyPr/>
+          <a:lstStyle/>
+          <a:p>
+            <a:endParaRPr lang="en-US" dirty="0"/>
+          </a:p>
+        </p:txBody>
+      </p:sp>
+      <p:sp>
+        <p:nvSpPr>
+          <p:cNvPr id="4" name="Slide Number Placeholder 3"/>
+          <p:cNvSpPr>
+            <a:spLocks noGrp="1"/>
+          </p:cNvSpPr>
+          <p:nvPr>
+            <p:ph type="sldNum" sz="quarter" idx="5"/>
+          </p:nvPr>
+        </p:nvSpPr>
+        <p:spPr/>
+        <p:txBody>
+          <a:bodyPr/>
+          <a:lstStyle/>
+          <a:p>
+            <a:fld id="{F76C2444-79AB-FD43-84ED-1615AACC21A4}" type="slidenum">
+              <a:rPr lang="nl-NL" smtClean="0"/>
+              <a:t>6</a:t>
+            </a:fld>
+            <a:endParaRPr lang="nl-NL"/>
+          </a:p>
+        </p:txBody>
+      </p:sp>
+    </p:spTree>
+    <p:extLst>
+      <p:ext uri="{BB962C8B-B14F-4D97-AF65-F5344CB8AC3E}">
+        <p14:creationId xmlns:p14="http://schemas.microsoft.com/office/powerpoint/2010/main" val="2723841260"/>
       </p:ext>
     </p:extLst>
   </p:cSld>
@@ -8890,7 +8976,7 @@
         </p:nvSpPr>
         <p:spPr>
           <a:xfrm>
-            <a:off x="4674374" y="5347734"/>
+            <a:off x="4733641" y="5186868"/>
             <a:ext cx="2057230" cy="333906"/>
           </a:xfrm>
           <a:prstGeom prst="rect">
@@ -9091,13 +9177,17 @@
         </p:nvCxnSpPr>
         <p:spPr>
           <a:xfrm>
-            <a:off x="4278321" y="2482359"/>
-            <a:ext cx="0" cy="3061191"/>
+            <a:off x="4337588" y="2473892"/>
+            <a:ext cx="0" cy="2885508"/>
           </a:xfrm>
           <a:prstGeom prst="line">
             <a:avLst/>
           </a:prstGeom>
-          <a:ln w="28575"/>
+          <a:ln w="28575">
+            <a:solidFill>
+              <a:srgbClr val="FFC000"/>
+            </a:solidFill>
+          </a:ln>
         </p:spPr>
         <p:style>
           <a:lnRef idx="1">
@@ -9130,13 +9220,17 @@
         </p:nvCxnSpPr>
         <p:spPr>
           <a:xfrm>
-            <a:off x="4278321" y="5536005"/>
+            <a:off x="4327430" y="5359400"/>
             <a:ext cx="400349" cy="0"/>
           </a:xfrm>
           <a:prstGeom prst="line">
             <a:avLst/>
           </a:prstGeom>
-          <a:ln w="28575"/>
+          <a:ln w="28575">
+            <a:solidFill>
+              <a:srgbClr val="FFC000"/>
+            </a:solidFill>
+          </a:ln>
         </p:spPr>
         <p:style>
           <a:lnRef idx="1">
@@ -9169,13 +9263,17 @@
         </p:nvCxnSpPr>
         <p:spPr>
           <a:xfrm>
-            <a:off x="4948079" y="2464888"/>
+            <a:off x="4989190" y="2471067"/>
             <a:ext cx="0" cy="2262233"/>
           </a:xfrm>
           <a:prstGeom prst="line">
             <a:avLst/>
           </a:prstGeom>
-          <a:ln w="28575"/>
+          <a:ln w="28575">
+            <a:solidFill>
+              <a:srgbClr val="FFC000"/>
+            </a:solidFill>
+          </a:ln>
         </p:spPr>
         <p:style>
           <a:lnRef idx="1">
@@ -9208,13 +9306,17 @@
         </p:nvCxnSpPr>
         <p:spPr>
           <a:xfrm flipH="1">
-            <a:off x="4931751" y="4724965"/>
-            <a:ext cx="328804" cy="0"/>
+            <a:off x="4975744" y="4731144"/>
+            <a:ext cx="312476" cy="2156"/>
           </a:xfrm>
           <a:prstGeom prst="line">
             <a:avLst/>
           </a:prstGeom>
-          <a:ln w="28575"/>
+          <a:ln w="28575">
+            <a:solidFill>
+              <a:srgbClr val="FFC000"/>
+            </a:solidFill>
+          </a:ln>
         </p:spPr>
         <p:style>
           <a:lnRef idx="1">
@@ -9286,8 +9388,8 @@
         </p:nvCxnSpPr>
         <p:spPr>
           <a:xfrm>
-            <a:off x="5825851" y="2466942"/>
-            <a:ext cx="19609" cy="1574379"/>
+            <a:off x="5825851" y="2482359"/>
+            <a:ext cx="9804" cy="1574378"/>
           </a:xfrm>
           <a:prstGeom prst="line">
             <a:avLst/>
@@ -9325,7 +9427,7 @@
         </p:nvCxnSpPr>
         <p:spPr>
           <a:xfrm flipH="1">
-            <a:off x="5835655" y="4035340"/>
+            <a:off x="5835655" y="4044304"/>
             <a:ext cx="290926" cy="0"/>
           </a:xfrm>
           <a:prstGeom prst="line">
@@ -9565,7 +9667,7 @@
         </p:nvSpPr>
         <p:spPr>
           <a:xfrm>
-            <a:off x="5343996" y="4524870"/>
+            <a:off x="5385107" y="4420978"/>
             <a:ext cx="2983684" cy="333906"/>
           </a:xfrm>
           <a:prstGeom prst="rect">
@@ -9766,7 +9868,7 @@
         </p:nvCxnSpPr>
         <p:spPr>
           <a:xfrm>
-            <a:off x="6731604" y="2509869"/>
+            <a:off x="6743664" y="2480058"/>
             <a:ext cx="0" cy="688263"/>
           </a:xfrm>
           <a:prstGeom prst="line">
@@ -9805,7 +9907,7 @@
         </p:nvSpPr>
         <p:spPr>
           <a:xfrm>
-            <a:off x="7144551" y="2916590"/>
+            <a:off x="7156611" y="2886779"/>
             <a:ext cx="3120940" cy="457614"/>
           </a:xfrm>
           <a:prstGeom prst="rect">
@@ -10006,13 +10108,138 @@
         </p:nvCxnSpPr>
         <p:spPr>
           <a:xfrm flipH="1">
-            <a:off x="6737910" y="3185519"/>
+            <a:off x="6745488" y="3155708"/>
             <a:ext cx="328804" cy="0"/>
           </a:xfrm>
           <a:prstGeom prst="line">
             <a:avLst/>
           </a:prstGeom>
           <a:ln w="28575"/>
+        </p:spPr>
+        <p:style>
+          <a:lnRef idx="1">
+            <a:schemeClr val="accent1"/>
+          </a:lnRef>
+          <a:fillRef idx="0">
+            <a:schemeClr val="accent1"/>
+          </a:fillRef>
+          <a:effectRef idx="0">
+            <a:schemeClr val="accent1"/>
+          </a:effectRef>
+          <a:fontRef idx="minor">
+            <a:schemeClr val="tx1"/>
+          </a:fontRef>
+        </p:style>
+      </p:cxnSp>
+      <p:cxnSp>
+        <p:nvCxnSpPr>
+          <p:cNvPr id="24" name="Straight Connector 23">
+            <a:extLst>
+              <a:ext uri="{FF2B5EF4-FFF2-40B4-BE49-F238E27FC236}">
+                <a16:creationId xmlns:a16="http://schemas.microsoft.com/office/drawing/2014/main" id="{32371F23-3134-4420-B214-91048D180C7E}"/>
+              </a:ext>
+            </a:extLst>
+          </p:cNvPr>
+          <p:cNvCxnSpPr>
+            <a:cxnSpLocks/>
+          </p:cNvCxnSpPr>
+          <p:nvPr/>
+        </p:nvCxnSpPr>
+        <p:spPr>
+          <a:xfrm flipH="1">
+            <a:off x="6580564" y="2480058"/>
+            <a:ext cx="331987" cy="2302"/>
+          </a:xfrm>
+          <a:prstGeom prst="line">
+            <a:avLst/>
+          </a:prstGeom>
+          <a:ln w="28575"/>
+        </p:spPr>
+        <p:style>
+          <a:lnRef idx="1">
+            <a:schemeClr val="accent1"/>
+          </a:lnRef>
+          <a:fillRef idx="0">
+            <a:schemeClr val="accent1"/>
+          </a:fillRef>
+          <a:effectRef idx="0">
+            <a:schemeClr val="accent1"/>
+          </a:effectRef>
+          <a:fontRef idx="minor">
+            <a:schemeClr val="tx1"/>
+          </a:fontRef>
+        </p:style>
+      </p:cxnSp>
+      <p:cxnSp>
+        <p:nvCxnSpPr>
+          <p:cNvPr id="29" name="Straight Connector 28">
+            <a:extLst>
+              <a:ext uri="{FF2B5EF4-FFF2-40B4-BE49-F238E27FC236}">
+                <a16:creationId xmlns:a16="http://schemas.microsoft.com/office/drawing/2014/main" id="{2B1E3582-0B05-4135-AF4B-9CCE24F2B5A9}"/>
+              </a:ext>
+            </a:extLst>
+          </p:cNvPr>
+          <p:cNvCxnSpPr>
+            <a:cxnSpLocks/>
+          </p:cNvCxnSpPr>
+          <p:nvPr/>
+        </p:nvCxnSpPr>
+        <p:spPr>
+          <a:xfrm flipH="1">
+            <a:off x="4823196" y="2471590"/>
+            <a:ext cx="331987" cy="2302"/>
+          </a:xfrm>
+          <a:prstGeom prst="line">
+            <a:avLst/>
+          </a:prstGeom>
+          <a:ln w="28575">
+            <a:solidFill>
+              <a:srgbClr val="FFC000"/>
+            </a:solidFill>
+          </a:ln>
+        </p:spPr>
+        <p:style>
+          <a:lnRef idx="1">
+            <a:schemeClr val="accent1"/>
+          </a:lnRef>
+          <a:fillRef idx="0">
+            <a:schemeClr val="accent1"/>
+          </a:fillRef>
+          <a:effectRef idx="0">
+            <a:schemeClr val="accent1"/>
+          </a:effectRef>
+          <a:fontRef idx="minor">
+            <a:schemeClr val="tx1"/>
+          </a:fontRef>
+        </p:style>
+      </p:cxnSp>
+      <p:cxnSp>
+        <p:nvCxnSpPr>
+          <p:cNvPr id="30" name="Straight Connector 29">
+            <a:extLst>
+              <a:ext uri="{FF2B5EF4-FFF2-40B4-BE49-F238E27FC236}">
+                <a16:creationId xmlns:a16="http://schemas.microsoft.com/office/drawing/2014/main" id="{E4516032-F654-4EA6-8235-F970AA5828EC}"/>
+              </a:ext>
+            </a:extLst>
+          </p:cNvPr>
+          <p:cNvCxnSpPr>
+            <a:cxnSpLocks/>
+          </p:cNvCxnSpPr>
+          <p:nvPr/>
+        </p:nvCxnSpPr>
+        <p:spPr>
+          <a:xfrm flipH="1">
+            <a:off x="4171594" y="2464046"/>
+            <a:ext cx="331987" cy="2302"/>
+          </a:xfrm>
+          <a:prstGeom prst="line">
+            <a:avLst/>
+          </a:prstGeom>
+          <a:ln w="28575">
+            <a:solidFill>
+              <a:srgbClr val="FFC000"/>
+            </a:solidFill>
+          </a:ln>
         </p:spPr>
         <p:style>
           <a:lnRef idx="1">
@@ -13382,6 +13609,1648 @@
 </file>
 
 <file path=ppt/slides/slide6.xml><?xml version="1.0" encoding="utf-8"?>
+<p:sld xmlns:a="http://schemas.openxmlformats.org/drawingml/2006/main" xmlns:r="http://schemas.openxmlformats.org/officeDocument/2006/relationships" xmlns:p="http://schemas.openxmlformats.org/presentationml/2006/main">
+  <p:cSld>
+    <p:spTree>
+      <p:nvGrpSpPr>
+        <p:cNvPr id="1" name=""/>
+        <p:cNvGrpSpPr/>
+        <p:nvPr/>
+      </p:nvGrpSpPr>
+      <p:grpSpPr>
+        <a:xfrm>
+          <a:off x="0" y="0"/>
+          <a:ext cx="0" cy="0"/>
+          <a:chOff x="0" y="0"/>
+          <a:chExt cx="0" cy="0"/>
+        </a:xfrm>
+      </p:grpSpPr>
+      <p:sp>
+        <p:nvSpPr>
+          <p:cNvPr id="3" name="Content Placeholder 2">
+            <a:extLst>
+              <a:ext uri="{FF2B5EF4-FFF2-40B4-BE49-F238E27FC236}">
+                <a16:creationId xmlns:a16="http://schemas.microsoft.com/office/drawing/2014/main" id="{09568DF8-3C84-4EE1-BA49-05858D537E7C}"/>
+              </a:ext>
+            </a:extLst>
+          </p:cNvPr>
+          <p:cNvSpPr>
+            <a:spLocks noGrp="1"/>
+          </p:cNvSpPr>
+          <p:nvPr>
+            <p:ph sz="quarter" idx="10"/>
+          </p:nvPr>
+        </p:nvSpPr>
+        <p:spPr>
+          <a:xfrm>
+            <a:off x="4785655" y="681497"/>
+            <a:ext cx="3529182" cy="363984"/>
+          </a:xfrm>
+        </p:spPr>
+        <p:txBody>
+          <a:bodyPr/>
+          <a:lstStyle/>
+          <a:p>
+            <a:pPr marL="0" indent="0">
+              <a:buNone/>
+            </a:pPr>
+            <a:r>
+              <a:rPr lang="en-US" sz="1200" b="1" dirty="0"/>
+              <a:t>COLOR LEGEND</a:t>
+            </a:r>
+          </a:p>
+        </p:txBody>
+      </p:sp>
+      <p:sp>
+        <p:nvSpPr>
+          <p:cNvPr id="4" name="Textfeld 4">
+            <a:extLst>
+              <a:ext uri="{FF2B5EF4-FFF2-40B4-BE49-F238E27FC236}">
+                <a16:creationId xmlns:a16="http://schemas.microsoft.com/office/drawing/2014/main" id="{BD56AA90-8285-4355-AD6D-3C35DC3430F2}"/>
+              </a:ext>
+            </a:extLst>
+          </p:cNvPr>
+          <p:cNvSpPr txBox="1"/>
+          <p:nvPr/>
+        </p:nvSpPr>
+        <p:spPr>
+          <a:xfrm>
+            <a:off x="355539" y="584049"/>
+            <a:ext cx="2960914" cy="369332"/>
+          </a:xfrm>
+          <a:prstGeom prst="rect">
+            <a:avLst/>
+          </a:prstGeom>
+          <a:solidFill>
+            <a:schemeClr val="accent5">
+              <a:lumMod val="40000"/>
+              <a:lumOff val="60000"/>
+            </a:schemeClr>
+          </a:solidFill>
+        </p:spPr>
+        <p:txBody>
+          <a:bodyPr wrap="square" rtlCol="0">
+            <a:spAutoFit/>
+          </a:bodyPr>
+          <a:lstStyle/>
+          <a:p>
+            <a:r>
+              <a:rPr lang="de-DE" b="1" dirty="0" err="1"/>
+              <a:t>vivaplus-main.key</a:t>
+            </a:r>
+            <a:endParaRPr lang="de-AT" b="1" dirty="0"/>
+          </a:p>
+        </p:txBody>
+      </p:sp>
+      <p:sp>
+        <p:nvSpPr>
+          <p:cNvPr id="9" name="Textfeld 4">
+            <a:extLst>
+              <a:ext uri="{FF2B5EF4-FFF2-40B4-BE49-F238E27FC236}">
+                <a16:creationId xmlns:a16="http://schemas.microsoft.com/office/drawing/2014/main" id="{437378B9-622C-4C81-BED3-9586D6470B02}"/>
+              </a:ext>
+            </a:extLst>
+          </p:cNvPr>
+          <p:cNvSpPr txBox="1"/>
+          <p:nvPr/>
+        </p:nvSpPr>
+        <p:spPr>
+          <a:xfrm>
+            <a:off x="990921" y="1708201"/>
+            <a:ext cx="2960914" cy="276999"/>
+          </a:xfrm>
+          <a:prstGeom prst="rect">
+            <a:avLst/>
+          </a:prstGeom>
+          <a:solidFill>
+            <a:schemeClr val="tx2">
+              <a:lumMod val="20000"/>
+              <a:lumOff val="80000"/>
+            </a:schemeClr>
+          </a:solidFill>
+          <a:ln>
+            <a:noFill/>
+          </a:ln>
+        </p:spPr>
+        <p:txBody>
+          <a:bodyPr wrap="square" rtlCol="0">
+            <a:spAutoFit/>
+          </a:bodyPr>
+          <a:lstStyle/>
+          <a:p>
+            <a:r>
+              <a:rPr lang="de-DE" sz="1175" b="1" dirty="0"/>
+              <a:t>Controls</a:t>
+            </a:r>
+            <a:endParaRPr lang="de-AT" sz="1175" b="1" dirty="0"/>
+          </a:p>
+        </p:txBody>
+      </p:sp>
+      <p:sp>
+        <p:nvSpPr>
+          <p:cNvPr id="11" name="Textfeld 4">
+            <a:extLst>
+              <a:ext uri="{FF2B5EF4-FFF2-40B4-BE49-F238E27FC236}">
+                <a16:creationId xmlns:a16="http://schemas.microsoft.com/office/drawing/2014/main" id="{EC225827-ECC4-4C33-857C-4A916C99DDD0}"/>
+              </a:ext>
+            </a:extLst>
+          </p:cNvPr>
+          <p:cNvSpPr txBox="1"/>
+          <p:nvPr/>
+        </p:nvSpPr>
+        <p:spPr>
+          <a:xfrm>
+            <a:off x="990921" y="2144987"/>
+            <a:ext cx="2960914" cy="273152"/>
+          </a:xfrm>
+          <a:prstGeom prst="rect">
+            <a:avLst/>
+          </a:prstGeom>
+          <a:solidFill>
+            <a:schemeClr val="tx2">
+              <a:lumMod val="20000"/>
+              <a:lumOff val="80000"/>
+            </a:schemeClr>
+          </a:solidFill>
+          <a:ln>
+            <a:noFill/>
+          </a:ln>
+        </p:spPr>
+        <p:txBody>
+          <a:bodyPr wrap="square" rtlCol="0">
+            <a:spAutoFit/>
+          </a:bodyPr>
+          <a:lstStyle/>
+          <a:p>
+            <a:r>
+              <a:rPr lang="de-DE" sz="1175" b="1" dirty="0" err="1"/>
+              <a:t>Global_Contact_Definition</a:t>
+            </a:r>
+            <a:endParaRPr lang="de-AT" sz="1175" b="1" dirty="0"/>
+          </a:p>
+        </p:txBody>
+      </p:sp>
+      <p:sp>
+        <p:nvSpPr>
+          <p:cNvPr id="13" name="Textfeld 4">
+            <a:extLst>
+              <a:ext uri="{FF2B5EF4-FFF2-40B4-BE49-F238E27FC236}">
+                <a16:creationId xmlns:a16="http://schemas.microsoft.com/office/drawing/2014/main" id="{6AC026DA-2FE9-4D5A-AC8B-F725C9AD9E40}"/>
+              </a:ext>
+            </a:extLst>
+          </p:cNvPr>
+          <p:cNvSpPr txBox="1"/>
+          <p:nvPr/>
+        </p:nvSpPr>
+        <p:spPr>
+          <a:xfrm>
+            <a:off x="990921" y="2581773"/>
+            <a:ext cx="2960914" cy="276999"/>
+          </a:xfrm>
+          <a:prstGeom prst="rect">
+            <a:avLst/>
+          </a:prstGeom>
+          <a:solidFill>
+            <a:schemeClr val="accent2"/>
+          </a:solidFill>
+        </p:spPr>
+        <p:txBody>
+          <a:bodyPr wrap="square" rtlCol="0">
+            <a:spAutoFit/>
+          </a:bodyPr>
+          <a:lstStyle/>
+          <a:p>
+            <a:r>
+              <a:rPr lang="de-DE" sz="1175" dirty="0" err="1"/>
+              <a:t>vivaplus-head</a:t>
+            </a:r>
+            <a:endParaRPr lang="de-AT" sz="1175" dirty="0"/>
+          </a:p>
+        </p:txBody>
+      </p:sp>
+      <p:sp>
+        <p:nvSpPr>
+          <p:cNvPr id="15" name="Textfeld 4">
+            <a:extLst>
+              <a:ext uri="{FF2B5EF4-FFF2-40B4-BE49-F238E27FC236}">
+                <a16:creationId xmlns:a16="http://schemas.microsoft.com/office/drawing/2014/main" id="{E3F51CED-E502-4FBC-878E-5A3D0A3B2C92}"/>
+              </a:ext>
+            </a:extLst>
+          </p:cNvPr>
+          <p:cNvSpPr txBox="1"/>
+          <p:nvPr/>
+        </p:nvSpPr>
+        <p:spPr>
+          <a:xfrm>
+            <a:off x="990921" y="3018559"/>
+            <a:ext cx="2960914" cy="276999"/>
+          </a:xfrm>
+          <a:prstGeom prst="rect">
+            <a:avLst/>
+          </a:prstGeom>
+          <a:solidFill>
+            <a:schemeClr val="accent2"/>
+          </a:solidFill>
+        </p:spPr>
+        <p:txBody>
+          <a:bodyPr wrap="square" rtlCol="0">
+            <a:spAutoFit/>
+          </a:bodyPr>
+          <a:lstStyle/>
+          <a:p>
+            <a:r>
+              <a:rPr lang="de-DE" sz="1175" dirty="0" err="1"/>
+              <a:t>vivaplus</a:t>
+            </a:r>
+            <a:r>
+              <a:rPr lang="de-DE" sz="1175" dirty="0"/>
+              <a:t>-neck</a:t>
+            </a:r>
+            <a:endParaRPr lang="de-AT" sz="1175" dirty="0"/>
+          </a:p>
+        </p:txBody>
+      </p:sp>
+      <p:sp>
+        <p:nvSpPr>
+          <p:cNvPr id="17" name="Textfeld 4">
+            <a:extLst>
+              <a:ext uri="{FF2B5EF4-FFF2-40B4-BE49-F238E27FC236}">
+                <a16:creationId xmlns:a16="http://schemas.microsoft.com/office/drawing/2014/main" id="{19B43241-253F-4E3F-8237-D688FD495CE3}"/>
+              </a:ext>
+            </a:extLst>
+          </p:cNvPr>
+          <p:cNvSpPr txBox="1"/>
+          <p:nvPr/>
+        </p:nvSpPr>
+        <p:spPr>
+          <a:xfrm>
+            <a:off x="990921" y="3455345"/>
+            <a:ext cx="2960914" cy="276999"/>
+          </a:xfrm>
+          <a:prstGeom prst="rect">
+            <a:avLst/>
+          </a:prstGeom>
+          <a:solidFill>
+            <a:schemeClr val="accent2"/>
+          </a:solidFill>
+        </p:spPr>
+        <p:txBody>
+          <a:bodyPr wrap="square" rtlCol="0">
+            <a:spAutoFit/>
+          </a:bodyPr>
+          <a:lstStyle/>
+          <a:p>
+            <a:r>
+              <a:rPr lang="de-DE" sz="1175" dirty="0" err="1"/>
+              <a:t>vivaplus</a:t>
+            </a:r>
+            <a:r>
+              <a:rPr lang="de-DE" sz="1175" dirty="0"/>
+              <a:t>-thorax</a:t>
+            </a:r>
+            <a:endParaRPr lang="de-AT" sz="1175" dirty="0"/>
+          </a:p>
+        </p:txBody>
+      </p:sp>
+      <p:sp>
+        <p:nvSpPr>
+          <p:cNvPr id="20" name="Textfeld 4">
+            <a:extLst>
+              <a:ext uri="{FF2B5EF4-FFF2-40B4-BE49-F238E27FC236}">
+                <a16:creationId xmlns:a16="http://schemas.microsoft.com/office/drawing/2014/main" id="{7B296326-FE9B-44F2-9826-5825AF668E05}"/>
+              </a:ext>
+            </a:extLst>
+          </p:cNvPr>
+          <p:cNvSpPr txBox="1"/>
+          <p:nvPr/>
+        </p:nvSpPr>
+        <p:spPr>
+          <a:xfrm>
+            <a:off x="990921" y="3892131"/>
+            <a:ext cx="2960914" cy="276999"/>
+          </a:xfrm>
+          <a:prstGeom prst="rect">
+            <a:avLst/>
+          </a:prstGeom>
+          <a:solidFill>
+            <a:schemeClr val="accent2"/>
+          </a:solidFill>
+        </p:spPr>
+        <p:txBody>
+          <a:bodyPr wrap="square" rtlCol="0">
+            <a:spAutoFit/>
+          </a:bodyPr>
+          <a:lstStyle/>
+          <a:p>
+            <a:r>
+              <a:rPr lang="de-DE" sz="1175" dirty="0" err="1"/>
+              <a:t>vivaplus</a:t>
+            </a:r>
+            <a:r>
+              <a:rPr lang="de-DE" sz="1175" dirty="0"/>
+              <a:t>-abdomen</a:t>
+            </a:r>
+            <a:endParaRPr lang="de-AT" sz="1175" dirty="0"/>
+          </a:p>
+        </p:txBody>
+      </p:sp>
+      <p:sp>
+        <p:nvSpPr>
+          <p:cNvPr id="22" name="Textfeld 4">
+            <a:extLst>
+              <a:ext uri="{FF2B5EF4-FFF2-40B4-BE49-F238E27FC236}">
+                <a16:creationId xmlns:a16="http://schemas.microsoft.com/office/drawing/2014/main" id="{9F7C5C62-B238-4EE4-87ED-C5536F761E24}"/>
+              </a:ext>
+            </a:extLst>
+          </p:cNvPr>
+          <p:cNvSpPr txBox="1"/>
+          <p:nvPr/>
+        </p:nvSpPr>
+        <p:spPr>
+          <a:xfrm>
+            <a:off x="990921" y="4327762"/>
+            <a:ext cx="2960914" cy="276999"/>
+          </a:xfrm>
+          <a:prstGeom prst="rect">
+            <a:avLst/>
+          </a:prstGeom>
+          <a:solidFill>
+            <a:schemeClr val="accent2"/>
+          </a:solidFill>
+        </p:spPr>
+        <p:txBody>
+          <a:bodyPr wrap="square" rtlCol="0">
+            <a:spAutoFit/>
+          </a:bodyPr>
+          <a:lstStyle/>
+          <a:p>
+            <a:r>
+              <a:rPr lang="de-DE" sz="1175" dirty="0" err="1"/>
+              <a:t>vivaplus-pelvis</a:t>
+            </a:r>
+            <a:endParaRPr lang="de-AT" sz="1175" dirty="0"/>
+          </a:p>
+        </p:txBody>
+      </p:sp>
+      <p:sp>
+        <p:nvSpPr>
+          <p:cNvPr id="24" name="Textfeld 4">
+            <a:extLst>
+              <a:ext uri="{FF2B5EF4-FFF2-40B4-BE49-F238E27FC236}">
+                <a16:creationId xmlns:a16="http://schemas.microsoft.com/office/drawing/2014/main" id="{A1853890-D998-4D2F-AB4B-B336B1BA7316}"/>
+              </a:ext>
+            </a:extLst>
+          </p:cNvPr>
+          <p:cNvSpPr txBox="1"/>
+          <p:nvPr/>
+        </p:nvSpPr>
+        <p:spPr>
+          <a:xfrm>
+            <a:off x="989269" y="4763393"/>
+            <a:ext cx="2960914" cy="276999"/>
+          </a:xfrm>
+          <a:prstGeom prst="rect">
+            <a:avLst/>
+          </a:prstGeom>
+          <a:solidFill>
+            <a:schemeClr val="accent2"/>
+          </a:solidFill>
+        </p:spPr>
+        <p:txBody>
+          <a:bodyPr wrap="square" rtlCol="0">
+            <a:spAutoFit/>
+          </a:bodyPr>
+          <a:lstStyle/>
+          <a:p>
+            <a:r>
+              <a:rPr lang="de-DE" sz="1175" dirty="0" err="1"/>
+              <a:t>vivaplus-upper-extremities</a:t>
+            </a:r>
+            <a:endParaRPr lang="de-AT" sz="1175" dirty="0"/>
+          </a:p>
+        </p:txBody>
+      </p:sp>
+      <p:sp>
+        <p:nvSpPr>
+          <p:cNvPr id="26" name="Textfeld 4">
+            <a:extLst>
+              <a:ext uri="{FF2B5EF4-FFF2-40B4-BE49-F238E27FC236}">
+                <a16:creationId xmlns:a16="http://schemas.microsoft.com/office/drawing/2014/main" id="{B99A418C-3779-48CE-9ED3-54304BC5897E}"/>
+              </a:ext>
+            </a:extLst>
+          </p:cNvPr>
+          <p:cNvSpPr txBox="1"/>
+          <p:nvPr/>
+        </p:nvSpPr>
+        <p:spPr>
+          <a:xfrm>
+            <a:off x="990921" y="5199022"/>
+            <a:ext cx="2960914" cy="276999"/>
+          </a:xfrm>
+          <a:prstGeom prst="rect">
+            <a:avLst/>
+          </a:prstGeom>
+          <a:solidFill>
+            <a:schemeClr val="accent2"/>
+          </a:solidFill>
+        </p:spPr>
+        <p:txBody>
+          <a:bodyPr wrap="square" rtlCol="0">
+            <a:spAutoFit/>
+          </a:bodyPr>
+          <a:lstStyle/>
+          <a:p>
+            <a:r>
+              <a:rPr lang="de-DE" sz="1175" dirty="0" err="1"/>
+              <a:t>vivapus-lower-extremities</a:t>
+            </a:r>
+            <a:endParaRPr lang="de-AT" sz="1175" dirty="0"/>
+          </a:p>
+        </p:txBody>
+      </p:sp>
+      <p:grpSp>
+        <p:nvGrpSpPr>
+          <p:cNvPr id="18" name="Group 17">
+            <a:extLst>
+              <a:ext uri="{FF2B5EF4-FFF2-40B4-BE49-F238E27FC236}">
+                <a16:creationId xmlns:a16="http://schemas.microsoft.com/office/drawing/2014/main" id="{EDB1A67E-FC67-4C85-9B5F-8EDFC1F679F7}"/>
+              </a:ext>
+            </a:extLst>
+          </p:cNvPr>
+          <p:cNvGrpSpPr/>
+          <p:nvPr/>
+        </p:nvGrpSpPr>
+        <p:grpSpPr>
+          <a:xfrm>
+            <a:off x="514349" y="946716"/>
+            <a:ext cx="472442" cy="4828085"/>
+            <a:chOff x="514349" y="946716"/>
+            <a:chExt cx="472442" cy="4828085"/>
+          </a:xfrm>
+        </p:grpSpPr>
+        <p:cxnSp>
+          <p:nvCxnSpPr>
+            <p:cNvPr id="6" name="Straight Connector 5">
+              <a:extLst>
+                <a:ext uri="{FF2B5EF4-FFF2-40B4-BE49-F238E27FC236}">
+                  <a16:creationId xmlns:a16="http://schemas.microsoft.com/office/drawing/2014/main" id="{3263956F-F855-445B-896A-0C5BBC350EAF}"/>
+                </a:ext>
+              </a:extLst>
+            </p:cNvPr>
+            <p:cNvCxnSpPr>
+              <a:cxnSpLocks/>
+            </p:cNvCxnSpPr>
+            <p:nvPr/>
+          </p:nvCxnSpPr>
+          <p:spPr>
+            <a:xfrm>
+              <a:off x="514349" y="946716"/>
+              <a:ext cx="2478" cy="4828085"/>
+            </a:xfrm>
+            <a:prstGeom prst="line">
+              <a:avLst/>
+            </a:prstGeom>
+            <a:ln w="12700"/>
+          </p:spPr>
+          <p:style>
+            <a:lnRef idx="1">
+              <a:schemeClr val="accent1"/>
+            </a:lnRef>
+            <a:fillRef idx="0">
+              <a:schemeClr val="accent1"/>
+            </a:fillRef>
+            <a:effectRef idx="0">
+              <a:schemeClr val="accent1"/>
+            </a:effectRef>
+            <a:fontRef idx="minor">
+              <a:schemeClr val="tx1"/>
+            </a:fontRef>
+          </p:style>
+        </p:cxnSp>
+        <p:cxnSp>
+          <p:nvCxnSpPr>
+            <p:cNvPr id="8" name="Straight Connector 7">
+              <a:extLst>
+                <a:ext uri="{FF2B5EF4-FFF2-40B4-BE49-F238E27FC236}">
+                  <a16:creationId xmlns:a16="http://schemas.microsoft.com/office/drawing/2014/main" id="{16FBE0EC-D528-4C64-BD30-BB424EF895B5}"/>
+                </a:ext>
+              </a:extLst>
+            </p:cNvPr>
+            <p:cNvCxnSpPr/>
+            <p:nvPr/>
+          </p:nvCxnSpPr>
+          <p:spPr>
+            <a:xfrm>
+              <a:off x="520131" y="1398524"/>
+              <a:ext cx="466660" cy="0"/>
+            </a:xfrm>
+            <a:prstGeom prst="line">
+              <a:avLst/>
+            </a:prstGeom>
+            <a:ln w="12700"/>
+          </p:spPr>
+          <p:style>
+            <a:lnRef idx="1">
+              <a:schemeClr val="accent1"/>
+            </a:lnRef>
+            <a:fillRef idx="0">
+              <a:schemeClr val="accent1"/>
+            </a:fillRef>
+            <a:effectRef idx="0">
+              <a:schemeClr val="accent1"/>
+            </a:effectRef>
+            <a:fontRef idx="minor">
+              <a:schemeClr val="tx1"/>
+            </a:fontRef>
+          </p:style>
+        </p:cxnSp>
+        <p:cxnSp>
+          <p:nvCxnSpPr>
+            <p:cNvPr id="10" name="Straight Connector 9">
+              <a:extLst>
+                <a:ext uri="{FF2B5EF4-FFF2-40B4-BE49-F238E27FC236}">
+                  <a16:creationId xmlns:a16="http://schemas.microsoft.com/office/drawing/2014/main" id="{4F206D38-9FA1-4306-B695-39E07DDBF26B}"/>
+                </a:ext>
+              </a:extLst>
+            </p:cNvPr>
+            <p:cNvCxnSpPr/>
+            <p:nvPr/>
+          </p:nvCxnSpPr>
+          <p:spPr>
+            <a:xfrm>
+              <a:off x="520131" y="1835310"/>
+              <a:ext cx="466660" cy="0"/>
+            </a:xfrm>
+            <a:prstGeom prst="line">
+              <a:avLst/>
+            </a:prstGeom>
+            <a:ln w="12700"/>
+          </p:spPr>
+          <p:style>
+            <a:lnRef idx="1">
+              <a:schemeClr val="accent1"/>
+            </a:lnRef>
+            <a:fillRef idx="0">
+              <a:schemeClr val="accent1"/>
+            </a:fillRef>
+            <a:effectRef idx="0">
+              <a:schemeClr val="accent1"/>
+            </a:effectRef>
+            <a:fontRef idx="minor">
+              <a:schemeClr val="tx1"/>
+            </a:fontRef>
+          </p:style>
+        </p:cxnSp>
+        <p:cxnSp>
+          <p:nvCxnSpPr>
+            <p:cNvPr id="12" name="Straight Connector 11">
+              <a:extLst>
+                <a:ext uri="{FF2B5EF4-FFF2-40B4-BE49-F238E27FC236}">
+                  <a16:creationId xmlns:a16="http://schemas.microsoft.com/office/drawing/2014/main" id="{82B04489-6A67-4275-9DE7-A7A60AC5E0FA}"/>
+                </a:ext>
+              </a:extLst>
+            </p:cNvPr>
+            <p:cNvCxnSpPr/>
+            <p:nvPr/>
+          </p:nvCxnSpPr>
+          <p:spPr>
+            <a:xfrm>
+              <a:off x="520131" y="2272096"/>
+              <a:ext cx="466660" cy="0"/>
+            </a:xfrm>
+            <a:prstGeom prst="line">
+              <a:avLst/>
+            </a:prstGeom>
+            <a:ln w="12700"/>
+          </p:spPr>
+          <p:style>
+            <a:lnRef idx="1">
+              <a:schemeClr val="accent1"/>
+            </a:lnRef>
+            <a:fillRef idx="0">
+              <a:schemeClr val="accent1"/>
+            </a:fillRef>
+            <a:effectRef idx="0">
+              <a:schemeClr val="accent1"/>
+            </a:effectRef>
+            <a:fontRef idx="minor">
+              <a:schemeClr val="tx1"/>
+            </a:fontRef>
+          </p:style>
+        </p:cxnSp>
+        <p:cxnSp>
+          <p:nvCxnSpPr>
+            <p:cNvPr id="14" name="Straight Connector 13">
+              <a:extLst>
+                <a:ext uri="{FF2B5EF4-FFF2-40B4-BE49-F238E27FC236}">
+                  <a16:creationId xmlns:a16="http://schemas.microsoft.com/office/drawing/2014/main" id="{F49C3527-501D-4F66-826E-092615C14FF7}"/>
+                </a:ext>
+              </a:extLst>
+            </p:cNvPr>
+            <p:cNvCxnSpPr/>
+            <p:nvPr/>
+          </p:nvCxnSpPr>
+          <p:spPr>
+            <a:xfrm>
+              <a:off x="520131" y="2708882"/>
+              <a:ext cx="466660" cy="0"/>
+            </a:xfrm>
+            <a:prstGeom prst="line">
+              <a:avLst/>
+            </a:prstGeom>
+            <a:ln w="12700"/>
+          </p:spPr>
+          <p:style>
+            <a:lnRef idx="1">
+              <a:schemeClr val="accent1"/>
+            </a:lnRef>
+            <a:fillRef idx="0">
+              <a:schemeClr val="accent1"/>
+            </a:fillRef>
+            <a:effectRef idx="0">
+              <a:schemeClr val="accent1"/>
+            </a:effectRef>
+            <a:fontRef idx="minor">
+              <a:schemeClr val="tx1"/>
+            </a:fontRef>
+          </p:style>
+        </p:cxnSp>
+        <p:cxnSp>
+          <p:nvCxnSpPr>
+            <p:cNvPr id="16" name="Straight Connector 15">
+              <a:extLst>
+                <a:ext uri="{FF2B5EF4-FFF2-40B4-BE49-F238E27FC236}">
+                  <a16:creationId xmlns:a16="http://schemas.microsoft.com/office/drawing/2014/main" id="{F73FEF67-EB17-42F3-BF68-9B1B7CD1AD10}"/>
+                </a:ext>
+              </a:extLst>
+            </p:cNvPr>
+            <p:cNvCxnSpPr/>
+            <p:nvPr/>
+          </p:nvCxnSpPr>
+          <p:spPr>
+            <a:xfrm>
+              <a:off x="520131" y="3145668"/>
+              <a:ext cx="466660" cy="0"/>
+            </a:xfrm>
+            <a:prstGeom prst="line">
+              <a:avLst/>
+            </a:prstGeom>
+            <a:ln w="12700"/>
+          </p:spPr>
+          <p:style>
+            <a:lnRef idx="1">
+              <a:schemeClr val="accent1"/>
+            </a:lnRef>
+            <a:fillRef idx="0">
+              <a:schemeClr val="accent1"/>
+            </a:fillRef>
+            <a:effectRef idx="0">
+              <a:schemeClr val="accent1"/>
+            </a:effectRef>
+            <a:fontRef idx="minor">
+              <a:schemeClr val="tx1"/>
+            </a:fontRef>
+          </p:style>
+        </p:cxnSp>
+        <p:cxnSp>
+          <p:nvCxnSpPr>
+            <p:cNvPr id="19" name="Straight Connector 18">
+              <a:extLst>
+                <a:ext uri="{FF2B5EF4-FFF2-40B4-BE49-F238E27FC236}">
+                  <a16:creationId xmlns:a16="http://schemas.microsoft.com/office/drawing/2014/main" id="{056BF9FB-F0DD-4C62-B7B6-5A7B67B7B37D}"/>
+                </a:ext>
+              </a:extLst>
+            </p:cNvPr>
+            <p:cNvCxnSpPr/>
+            <p:nvPr/>
+          </p:nvCxnSpPr>
+          <p:spPr>
+            <a:xfrm>
+              <a:off x="520131" y="3582454"/>
+              <a:ext cx="466660" cy="0"/>
+            </a:xfrm>
+            <a:prstGeom prst="line">
+              <a:avLst/>
+            </a:prstGeom>
+            <a:ln w="12700"/>
+          </p:spPr>
+          <p:style>
+            <a:lnRef idx="1">
+              <a:schemeClr val="accent1"/>
+            </a:lnRef>
+            <a:fillRef idx="0">
+              <a:schemeClr val="accent1"/>
+            </a:fillRef>
+            <a:effectRef idx="0">
+              <a:schemeClr val="accent1"/>
+            </a:effectRef>
+            <a:fontRef idx="minor">
+              <a:schemeClr val="tx1"/>
+            </a:fontRef>
+          </p:style>
+        </p:cxnSp>
+        <p:cxnSp>
+          <p:nvCxnSpPr>
+            <p:cNvPr id="21" name="Straight Connector 20">
+              <a:extLst>
+                <a:ext uri="{FF2B5EF4-FFF2-40B4-BE49-F238E27FC236}">
+                  <a16:creationId xmlns:a16="http://schemas.microsoft.com/office/drawing/2014/main" id="{B7708910-4115-47BB-BEF0-C1E43DEF38E2}"/>
+                </a:ext>
+              </a:extLst>
+            </p:cNvPr>
+            <p:cNvCxnSpPr/>
+            <p:nvPr/>
+          </p:nvCxnSpPr>
+          <p:spPr>
+            <a:xfrm>
+              <a:off x="520131" y="4018085"/>
+              <a:ext cx="466660" cy="0"/>
+            </a:xfrm>
+            <a:prstGeom prst="line">
+              <a:avLst/>
+            </a:prstGeom>
+            <a:ln w="12700"/>
+          </p:spPr>
+          <p:style>
+            <a:lnRef idx="1">
+              <a:schemeClr val="accent1"/>
+            </a:lnRef>
+            <a:fillRef idx="0">
+              <a:schemeClr val="accent1"/>
+            </a:fillRef>
+            <a:effectRef idx="0">
+              <a:schemeClr val="accent1"/>
+            </a:effectRef>
+            <a:fontRef idx="minor">
+              <a:schemeClr val="tx1"/>
+            </a:fontRef>
+          </p:style>
+        </p:cxnSp>
+        <p:cxnSp>
+          <p:nvCxnSpPr>
+            <p:cNvPr id="23" name="Straight Connector 22">
+              <a:extLst>
+                <a:ext uri="{FF2B5EF4-FFF2-40B4-BE49-F238E27FC236}">
+                  <a16:creationId xmlns:a16="http://schemas.microsoft.com/office/drawing/2014/main" id="{3AABA935-6CB6-4ED3-9B89-F26F6FE16245}"/>
+                </a:ext>
+              </a:extLst>
+            </p:cNvPr>
+            <p:cNvCxnSpPr/>
+            <p:nvPr/>
+          </p:nvCxnSpPr>
+          <p:spPr>
+            <a:xfrm>
+              <a:off x="518479" y="4453716"/>
+              <a:ext cx="466660" cy="0"/>
+            </a:xfrm>
+            <a:prstGeom prst="line">
+              <a:avLst/>
+            </a:prstGeom>
+            <a:ln w="12700"/>
+          </p:spPr>
+          <p:style>
+            <a:lnRef idx="1">
+              <a:schemeClr val="accent1"/>
+            </a:lnRef>
+            <a:fillRef idx="0">
+              <a:schemeClr val="accent1"/>
+            </a:fillRef>
+            <a:effectRef idx="0">
+              <a:schemeClr val="accent1"/>
+            </a:effectRef>
+            <a:fontRef idx="minor">
+              <a:schemeClr val="tx1"/>
+            </a:fontRef>
+          </p:style>
+        </p:cxnSp>
+        <p:cxnSp>
+          <p:nvCxnSpPr>
+            <p:cNvPr id="25" name="Straight Connector 24">
+              <a:extLst>
+                <a:ext uri="{FF2B5EF4-FFF2-40B4-BE49-F238E27FC236}">
+                  <a16:creationId xmlns:a16="http://schemas.microsoft.com/office/drawing/2014/main" id="{C5537A90-9D4B-43B9-94AA-15C7EA516FC8}"/>
+                </a:ext>
+              </a:extLst>
+            </p:cNvPr>
+            <p:cNvCxnSpPr/>
+            <p:nvPr/>
+          </p:nvCxnSpPr>
+          <p:spPr>
+            <a:xfrm>
+              <a:off x="520131" y="4889345"/>
+              <a:ext cx="466660" cy="0"/>
+            </a:xfrm>
+            <a:prstGeom prst="line">
+              <a:avLst/>
+            </a:prstGeom>
+            <a:ln w="12700"/>
+          </p:spPr>
+          <p:style>
+            <a:lnRef idx="1">
+              <a:schemeClr val="accent1"/>
+            </a:lnRef>
+            <a:fillRef idx="0">
+              <a:schemeClr val="accent1"/>
+            </a:fillRef>
+            <a:effectRef idx="0">
+              <a:schemeClr val="accent1"/>
+            </a:effectRef>
+            <a:fontRef idx="minor">
+              <a:schemeClr val="tx1"/>
+            </a:fontRef>
+          </p:style>
+        </p:cxnSp>
+        <p:cxnSp>
+          <p:nvCxnSpPr>
+            <p:cNvPr id="28" name="Straight Connector 27">
+              <a:extLst>
+                <a:ext uri="{FF2B5EF4-FFF2-40B4-BE49-F238E27FC236}">
+                  <a16:creationId xmlns:a16="http://schemas.microsoft.com/office/drawing/2014/main" id="{A1E9E974-031D-47F2-8BB0-C1ABDB248258}"/>
+                </a:ext>
+              </a:extLst>
+            </p:cNvPr>
+            <p:cNvCxnSpPr/>
+            <p:nvPr/>
+          </p:nvCxnSpPr>
+          <p:spPr>
+            <a:xfrm>
+              <a:off x="516827" y="5324973"/>
+              <a:ext cx="466660" cy="0"/>
+            </a:xfrm>
+            <a:prstGeom prst="line">
+              <a:avLst/>
+            </a:prstGeom>
+            <a:ln w="12700"/>
+          </p:spPr>
+          <p:style>
+            <a:lnRef idx="1">
+              <a:schemeClr val="accent1"/>
+            </a:lnRef>
+            <a:fillRef idx="0">
+              <a:schemeClr val="accent1"/>
+            </a:fillRef>
+            <a:effectRef idx="0">
+              <a:schemeClr val="accent1"/>
+            </a:effectRef>
+            <a:fontRef idx="minor">
+              <a:schemeClr val="tx1"/>
+            </a:fontRef>
+          </p:style>
+        </p:cxnSp>
+        <p:cxnSp>
+          <p:nvCxnSpPr>
+            <p:cNvPr id="30" name="Straight Connector 29">
+              <a:extLst>
+                <a:ext uri="{FF2B5EF4-FFF2-40B4-BE49-F238E27FC236}">
+                  <a16:creationId xmlns:a16="http://schemas.microsoft.com/office/drawing/2014/main" id="{041CC85D-0AB2-4709-97F4-372536C40310}"/>
+                </a:ext>
+              </a:extLst>
+            </p:cNvPr>
+            <p:cNvCxnSpPr/>
+            <p:nvPr/>
+          </p:nvCxnSpPr>
+          <p:spPr>
+            <a:xfrm>
+              <a:off x="518479" y="5760602"/>
+              <a:ext cx="466660" cy="0"/>
+            </a:xfrm>
+            <a:prstGeom prst="line">
+              <a:avLst/>
+            </a:prstGeom>
+            <a:ln w="12700"/>
+          </p:spPr>
+          <p:style>
+            <a:lnRef idx="1">
+              <a:schemeClr val="accent1"/>
+            </a:lnRef>
+            <a:fillRef idx="0">
+              <a:schemeClr val="accent1"/>
+            </a:fillRef>
+            <a:effectRef idx="0">
+              <a:schemeClr val="accent1"/>
+            </a:effectRef>
+            <a:fontRef idx="minor">
+              <a:schemeClr val="tx1"/>
+            </a:fontRef>
+          </p:style>
+        </p:cxnSp>
+      </p:grpSp>
+      <p:sp>
+        <p:nvSpPr>
+          <p:cNvPr id="34" name="Textfeld 4">
+            <a:extLst>
+              <a:ext uri="{FF2B5EF4-FFF2-40B4-BE49-F238E27FC236}">
+                <a16:creationId xmlns:a16="http://schemas.microsoft.com/office/drawing/2014/main" id="{7E6504F3-6169-4885-9E61-39ABB4D370F3}"/>
+              </a:ext>
+            </a:extLst>
+          </p:cNvPr>
+          <p:cNvSpPr txBox="1"/>
+          <p:nvPr/>
+        </p:nvSpPr>
+        <p:spPr>
+          <a:xfrm>
+            <a:off x="990921" y="5636302"/>
+            <a:ext cx="2960914" cy="273152"/>
+          </a:xfrm>
+          <a:prstGeom prst="rect">
+            <a:avLst/>
+          </a:prstGeom>
+          <a:solidFill>
+            <a:schemeClr val="tx2">
+              <a:lumMod val="20000"/>
+              <a:lumOff val="80000"/>
+            </a:schemeClr>
+          </a:solidFill>
+          <a:ln>
+            <a:noFill/>
+          </a:ln>
+        </p:spPr>
+        <p:txBody>
+          <a:bodyPr wrap="square" rtlCol="0">
+            <a:spAutoFit/>
+          </a:bodyPr>
+          <a:lstStyle/>
+          <a:p>
+            <a:r>
+              <a:rPr lang="de-DE" sz="1175" b="1" dirty="0" err="1"/>
+              <a:t>Vivaplus</a:t>
+            </a:r>
+            <a:r>
+              <a:rPr lang="de-DE" sz="1175" b="1" dirty="0"/>
+              <a:t>-model-integration</a:t>
+            </a:r>
+            <a:endParaRPr lang="de-AT" sz="1175" b="1" dirty="0"/>
+          </a:p>
+        </p:txBody>
+      </p:sp>
+      <p:sp>
+        <p:nvSpPr>
+          <p:cNvPr id="37" name="Textfeld 4">
+            <a:extLst>
+              <a:ext uri="{FF2B5EF4-FFF2-40B4-BE49-F238E27FC236}">
+                <a16:creationId xmlns:a16="http://schemas.microsoft.com/office/drawing/2014/main" id="{423E7AA9-FC65-439D-885B-726A78BEE15D}"/>
+              </a:ext>
+            </a:extLst>
+          </p:cNvPr>
+          <p:cNvSpPr txBox="1"/>
+          <p:nvPr/>
+        </p:nvSpPr>
+        <p:spPr>
+          <a:xfrm>
+            <a:off x="4855734" y="1339322"/>
+            <a:ext cx="348175" cy="276999"/>
+          </a:xfrm>
+          <a:prstGeom prst="rect">
+            <a:avLst/>
+          </a:prstGeom>
+          <a:solidFill>
+            <a:schemeClr val="tx2">
+              <a:lumMod val="20000"/>
+              <a:lumOff val="80000"/>
+            </a:schemeClr>
+          </a:solidFill>
+          <a:ln>
+            <a:noFill/>
+          </a:ln>
+        </p:spPr>
+        <p:txBody>
+          <a:bodyPr wrap="square" rtlCol="0">
+            <a:spAutoFit/>
+          </a:bodyPr>
+          <a:lstStyle/>
+          <a:p>
+            <a:endParaRPr lang="de-AT" sz="1200" b="1" dirty="0"/>
+          </a:p>
+        </p:txBody>
+      </p:sp>
+      <p:sp>
+        <p:nvSpPr>
+          <p:cNvPr id="38" name="Textfeld 4">
+            <a:extLst>
+              <a:ext uri="{FF2B5EF4-FFF2-40B4-BE49-F238E27FC236}">
+                <a16:creationId xmlns:a16="http://schemas.microsoft.com/office/drawing/2014/main" id="{015440A3-9764-4D1D-95FC-01E0B3A9589C}"/>
+              </a:ext>
+            </a:extLst>
+          </p:cNvPr>
+          <p:cNvSpPr txBox="1"/>
+          <p:nvPr/>
+        </p:nvSpPr>
+        <p:spPr>
+          <a:xfrm>
+            <a:off x="5273988" y="1358573"/>
+            <a:ext cx="2960914" cy="276999"/>
+          </a:xfrm>
+          <a:prstGeom prst="rect">
+            <a:avLst/>
+          </a:prstGeom>
+          <a:noFill/>
+          <a:ln>
+            <a:solidFill>
+              <a:schemeClr val="bg1"/>
+            </a:solidFill>
+          </a:ln>
+        </p:spPr>
+        <p:txBody>
+          <a:bodyPr wrap="square" rtlCol="0">
+            <a:spAutoFit/>
+          </a:bodyPr>
+          <a:lstStyle/>
+          <a:p>
+            <a:r>
+              <a:rPr lang="de-DE" sz="1200" b="1" dirty="0"/>
+              <a:t>Common </a:t>
+            </a:r>
+            <a:r>
+              <a:rPr lang="de-DE" sz="1200" b="1" dirty="0" err="1"/>
+              <a:t>for</a:t>
+            </a:r>
+            <a:r>
+              <a:rPr lang="de-DE" sz="1200" b="1" dirty="0"/>
+              <a:t> </a:t>
+            </a:r>
+            <a:r>
+              <a:rPr lang="de-DE" sz="1200" b="1" dirty="0" err="1"/>
+              <a:t>whole</a:t>
+            </a:r>
+            <a:r>
+              <a:rPr lang="de-DE" sz="1200" b="1" dirty="0"/>
+              <a:t> </a:t>
+            </a:r>
+            <a:r>
+              <a:rPr lang="de-DE" sz="1200" b="1" dirty="0" err="1"/>
+              <a:t>model</a:t>
+            </a:r>
+            <a:endParaRPr lang="de-AT" sz="1200" b="1" dirty="0"/>
+          </a:p>
+        </p:txBody>
+      </p:sp>
+      <p:sp>
+        <p:nvSpPr>
+          <p:cNvPr id="39" name="Textfeld 4">
+            <a:extLst>
+              <a:ext uri="{FF2B5EF4-FFF2-40B4-BE49-F238E27FC236}">
+                <a16:creationId xmlns:a16="http://schemas.microsoft.com/office/drawing/2014/main" id="{35A2CC76-8432-463C-AD3D-FA47521B4DCD}"/>
+              </a:ext>
+            </a:extLst>
+          </p:cNvPr>
+          <p:cNvSpPr txBox="1"/>
+          <p:nvPr/>
+        </p:nvSpPr>
+        <p:spPr>
+          <a:xfrm>
+            <a:off x="4855734" y="1737453"/>
+            <a:ext cx="348175" cy="276999"/>
+          </a:xfrm>
+          <a:prstGeom prst="rect">
+            <a:avLst/>
+          </a:prstGeom>
+          <a:solidFill>
+            <a:srgbClr val="FFC000"/>
+          </a:solidFill>
+          <a:ln>
+            <a:noFill/>
+          </a:ln>
+        </p:spPr>
+        <p:txBody>
+          <a:bodyPr wrap="square" rtlCol="0">
+            <a:spAutoFit/>
+          </a:bodyPr>
+          <a:lstStyle/>
+          <a:p>
+            <a:endParaRPr lang="de-AT" sz="1200" b="1" dirty="0"/>
+          </a:p>
+        </p:txBody>
+      </p:sp>
+      <p:sp>
+        <p:nvSpPr>
+          <p:cNvPr id="40" name="Textfeld 4">
+            <a:extLst>
+              <a:ext uri="{FF2B5EF4-FFF2-40B4-BE49-F238E27FC236}">
+                <a16:creationId xmlns:a16="http://schemas.microsoft.com/office/drawing/2014/main" id="{A1496EAA-33F8-408D-BEA0-04C17B477D58}"/>
+              </a:ext>
+            </a:extLst>
+          </p:cNvPr>
+          <p:cNvSpPr txBox="1"/>
+          <p:nvPr/>
+        </p:nvSpPr>
+        <p:spPr>
+          <a:xfrm>
+            <a:off x="5273988" y="1741587"/>
+            <a:ext cx="2960914" cy="276999"/>
+          </a:xfrm>
+          <a:prstGeom prst="rect">
+            <a:avLst/>
+          </a:prstGeom>
+          <a:noFill/>
+          <a:ln>
+            <a:noFill/>
+          </a:ln>
+        </p:spPr>
+        <p:txBody>
+          <a:bodyPr wrap="square" rtlCol="0">
+            <a:spAutoFit/>
+          </a:bodyPr>
+          <a:lstStyle/>
+          <a:p>
+            <a:r>
+              <a:rPr lang="de-DE" sz="1200" b="1" dirty="0"/>
+              <a:t>Body </a:t>
+            </a:r>
+            <a:r>
+              <a:rPr lang="de-DE" sz="1200" b="1" dirty="0" err="1"/>
+              <a:t>Regions</a:t>
+            </a:r>
+            <a:endParaRPr lang="de-AT" sz="1200" b="1" dirty="0"/>
+          </a:p>
+        </p:txBody>
+      </p:sp>
+      <p:sp>
+        <p:nvSpPr>
+          <p:cNvPr id="41" name="Textfeld 4">
+            <a:extLst>
+              <a:ext uri="{FF2B5EF4-FFF2-40B4-BE49-F238E27FC236}">
+                <a16:creationId xmlns:a16="http://schemas.microsoft.com/office/drawing/2014/main" id="{EC536A8C-5A6B-4D2B-80BE-194600935DA7}"/>
+              </a:ext>
+            </a:extLst>
+          </p:cNvPr>
+          <p:cNvSpPr txBox="1"/>
+          <p:nvPr/>
+        </p:nvSpPr>
+        <p:spPr>
+          <a:xfrm>
+            <a:off x="4855734" y="975338"/>
+            <a:ext cx="348175" cy="276999"/>
+          </a:xfrm>
+          <a:prstGeom prst="rect">
+            <a:avLst/>
+          </a:prstGeom>
+          <a:solidFill>
+            <a:schemeClr val="accent5">
+              <a:lumMod val="40000"/>
+              <a:lumOff val="60000"/>
+            </a:schemeClr>
+          </a:solidFill>
+          <a:ln>
+            <a:noFill/>
+          </a:ln>
+        </p:spPr>
+        <p:txBody>
+          <a:bodyPr wrap="square" rtlCol="0">
+            <a:spAutoFit/>
+          </a:bodyPr>
+          <a:lstStyle/>
+          <a:p>
+            <a:endParaRPr lang="de-AT" sz="1200" b="1" dirty="0"/>
+          </a:p>
+        </p:txBody>
+      </p:sp>
+      <p:sp>
+        <p:nvSpPr>
+          <p:cNvPr id="42" name="Textfeld 4">
+            <a:extLst>
+              <a:ext uri="{FF2B5EF4-FFF2-40B4-BE49-F238E27FC236}">
+                <a16:creationId xmlns:a16="http://schemas.microsoft.com/office/drawing/2014/main" id="{D6D03525-A454-4FEC-B243-36370AFA43D7}"/>
+              </a:ext>
+            </a:extLst>
+          </p:cNvPr>
+          <p:cNvSpPr txBox="1"/>
+          <p:nvPr/>
+        </p:nvSpPr>
+        <p:spPr>
+          <a:xfrm>
+            <a:off x="5273988" y="979472"/>
+            <a:ext cx="2960914" cy="276999"/>
+          </a:xfrm>
+          <a:prstGeom prst="rect">
+            <a:avLst/>
+          </a:prstGeom>
+          <a:noFill/>
+          <a:ln>
+            <a:noFill/>
+          </a:ln>
+        </p:spPr>
+        <p:txBody>
+          <a:bodyPr wrap="square" rtlCol="0">
+            <a:spAutoFit/>
+          </a:bodyPr>
+          <a:lstStyle/>
+          <a:p>
+            <a:r>
+              <a:rPr lang="de-DE" sz="1200" b="1" dirty="0"/>
+              <a:t>Main File</a:t>
+            </a:r>
+            <a:endParaRPr lang="de-AT" sz="1200" b="1" dirty="0"/>
+          </a:p>
+        </p:txBody>
+      </p:sp>
+      <p:grpSp>
+        <p:nvGrpSpPr>
+          <p:cNvPr id="35" name="Group 34">
+            <a:extLst>
+              <a:ext uri="{FF2B5EF4-FFF2-40B4-BE49-F238E27FC236}">
+                <a16:creationId xmlns:a16="http://schemas.microsoft.com/office/drawing/2014/main" id="{3E6066EE-580E-43D2-AA8E-A2D655BAC12C}"/>
+              </a:ext>
+            </a:extLst>
+          </p:cNvPr>
+          <p:cNvGrpSpPr/>
+          <p:nvPr/>
+        </p:nvGrpSpPr>
+        <p:grpSpPr>
+          <a:xfrm>
+            <a:off x="4075895" y="2708882"/>
+            <a:ext cx="1000466" cy="2616091"/>
+            <a:chOff x="4075895" y="2133596"/>
+            <a:chExt cx="1000466" cy="3762214"/>
+          </a:xfrm>
+        </p:grpSpPr>
+        <p:sp>
+          <p:nvSpPr>
+            <p:cNvPr id="2" name="Right Bracket 1">
+              <a:extLst>
+                <a:ext uri="{FF2B5EF4-FFF2-40B4-BE49-F238E27FC236}">
+                  <a16:creationId xmlns:a16="http://schemas.microsoft.com/office/drawing/2014/main" id="{27A66E44-DC17-45F0-8978-BFA321EB0A88}"/>
+                </a:ext>
+              </a:extLst>
+            </p:cNvPr>
+            <p:cNvSpPr/>
+            <p:nvPr/>
+          </p:nvSpPr>
+          <p:spPr>
+            <a:xfrm>
+              <a:off x="4075895" y="2133596"/>
+              <a:ext cx="235772" cy="3762214"/>
+            </a:xfrm>
+            <a:prstGeom prst="rightBracket">
+              <a:avLst/>
+            </a:prstGeom>
+            <a:ln w="28575">
+              <a:solidFill>
+                <a:schemeClr val="accent2">
+                  <a:lumMod val="75000"/>
+                </a:schemeClr>
+              </a:solidFill>
+            </a:ln>
+          </p:spPr>
+          <p:style>
+            <a:lnRef idx="1">
+              <a:schemeClr val="accent1"/>
+            </a:lnRef>
+            <a:fillRef idx="0">
+              <a:schemeClr val="accent1"/>
+            </a:fillRef>
+            <a:effectRef idx="0">
+              <a:schemeClr val="accent1"/>
+            </a:effectRef>
+            <a:fontRef idx="minor">
+              <a:schemeClr val="tx1"/>
+            </a:fontRef>
+          </p:style>
+          <p:txBody>
+            <a:bodyPr rtlCol="0" anchor="ctr"/>
+            <a:lstStyle/>
+            <a:p>
+              <a:pPr algn="ctr"/>
+              <a:endParaRPr lang="en-US"/>
+            </a:p>
+          </p:txBody>
+        </p:sp>
+        <p:cxnSp>
+          <p:nvCxnSpPr>
+            <p:cNvPr id="7" name="Straight Connector 6">
+              <a:extLst>
+                <a:ext uri="{FF2B5EF4-FFF2-40B4-BE49-F238E27FC236}">
+                  <a16:creationId xmlns:a16="http://schemas.microsoft.com/office/drawing/2014/main" id="{8DDEBDAB-D246-4732-AE42-484D97462BB8}"/>
+                </a:ext>
+              </a:extLst>
+            </p:cNvPr>
+            <p:cNvCxnSpPr>
+              <a:cxnSpLocks/>
+              <a:stCxn id="2" idx="2"/>
+            </p:cNvCxnSpPr>
+            <p:nvPr/>
+          </p:nvCxnSpPr>
+          <p:spPr>
+            <a:xfrm>
+              <a:off x="4311667" y="4014703"/>
+              <a:ext cx="389781" cy="92"/>
+            </a:xfrm>
+            <a:prstGeom prst="line">
+              <a:avLst/>
+            </a:prstGeom>
+            <a:ln w="28575">
+              <a:solidFill>
+                <a:schemeClr val="accent2">
+                  <a:lumMod val="75000"/>
+                </a:schemeClr>
+              </a:solidFill>
+            </a:ln>
+          </p:spPr>
+          <p:style>
+            <a:lnRef idx="1">
+              <a:schemeClr val="accent1"/>
+            </a:lnRef>
+            <a:fillRef idx="0">
+              <a:schemeClr val="accent1"/>
+            </a:fillRef>
+            <a:effectRef idx="0">
+              <a:schemeClr val="accent1"/>
+            </a:effectRef>
+            <a:fontRef idx="minor">
+              <a:schemeClr val="tx1"/>
+            </a:fontRef>
+          </p:style>
+        </p:cxnSp>
+        <p:sp>
+          <p:nvSpPr>
+            <p:cNvPr id="27" name="Left Bracket 26">
+              <a:extLst>
+                <a:ext uri="{FF2B5EF4-FFF2-40B4-BE49-F238E27FC236}">
+                  <a16:creationId xmlns:a16="http://schemas.microsoft.com/office/drawing/2014/main" id="{A37D047F-3F56-4654-8A2E-2C10D43FAB00}"/>
+                </a:ext>
+              </a:extLst>
+            </p:cNvPr>
+            <p:cNvSpPr/>
+            <p:nvPr/>
+          </p:nvSpPr>
+          <p:spPr>
+            <a:xfrm>
+              <a:off x="4701448" y="3717662"/>
+              <a:ext cx="374913" cy="594263"/>
+            </a:xfrm>
+            <a:prstGeom prst="leftBracket">
+              <a:avLst/>
+            </a:prstGeom>
+            <a:ln w="28575">
+              <a:solidFill>
+                <a:schemeClr val="accent2">
+                  <a:lumMod val="75000"/>
+                </a:schemeClr>
+              </a:solidFill>
+            </a:ln>
+          </p:spPr>
+          <p:style>
+            <a:lnRef idx="1">
+              <a:schemeClr val="accent1"/>
+            </a:lnRef>
+            <a:fillRef idx="0">
+              <a:schemeClr val="accent1"/>
+            </a:fillRef>
+            <a:effectRef idx="0">
+              <a:schemeClr val="accent1"/>
+            </a:effectRef>
+            <a:fontRef idx="minor">
+              <a:schemeClr val="tx1"/>
+            </a:fontRef>
+          </p:style>
+          <p:txBody>
+            <a:bodyPr rtlCol="0" anchor="ctr"/>
+            <a:lstStyle/>
+            <a:p>
+              <a:pPr algn="ctr"/>
+              <a:endParaRPr lang="en-US"/>
+            </a:p>
+          </p:txBody>
+        </p:sp>
+      </p:grpSp>
+      <p:sp>
+        <p:nvSpPr>
+          <p:cNvPr id="43" name="Textfeld 4">
+            <a:extLst>
+              <a:ext uri="{FF2B5EF4-FFF2-40B4-BE49-F238E27FC236}">
+                <a16:creationId xmlns:a16="http://schemas.microsoft.com/office/drawing/2014/main" id="{D3085598-F918-47F1-92C4-29C0EC3BD4D4}"/>
+              </a:ext>
+            </a:extLst>
+          </p:cNvPr>
+          <p:cNvSpPr txBox="1"/>
+          <p:nvPr/>
+        </p:nvSpPr>
+        <p:spPr>
+          <a:xfrm>
+            <a:off x="5076361" y="3672895"/>
+            <a:ext cx="2960914" cy="276999"/>
+          </a:xfrm>
+          <a:prstGeom prst="rect">
+            <a:avLst/>
+          </a:prstGeom>
+          <a:solidFill>
+            <a:schemeClr val="accent2">
+              <a:lumMod val="20000"/>
+              <a:lumOff val="80000"/>
+            </a:schemeClr>
+          </a:solidFill>
+        </p:spPr>
+        <p:txBody>
+          <a:bodyPr wrap="square" rtlCol="0">
+            <a:spAutoFit/>
+          </a:bodyPr>
+          <a:lstStyle/>
+          <a:p>
+            <a:r>
+              <a:rPr lang="de-DE" sz="1200" b="1" dirty="0"/>
+              <a:t>BODY-REGION-Elements</a:t>
+            </a:r>
+            <a:endParaRPr lang="de-AT" sz="1200" b="1" dirty="0"/>
+          </a:p>
+        </p:txBody>
+      </p:sp>
+      <p:sp>
+        <p:nvSpPr>
+          <p:cNvPr id="44" name="Textfeld 4">
+            <a:extLst>
+              <a:ext uri="{FF2B5EF4-FFF2-40B4-BE49-F238E27FC236}">
+                <a16:creationId xmlns:a16="http://schemas.microsoft.com/office/drawing/2014/main" id="{AA4D779A-C644-490B-93AF-07CC21D9E8D3}"/>
+              </a:ext>
+            </a:extLst>
+          </p:cNvPr>
+          <p:cNvSpPr txBox="1"/>
+          <p:nvPr/>
+        </p:nvSpPr>
+        <p:spPr>
+          <a:xfrm>
+            <a:off x="5076361" y="4085103"/>
+            <a:ext cx="2960914" cy="276999"/>
+          </a:xfrm>
+          <a:prstGeom prst="rect">
+            <a:avLst/>
+          </a:prstGeom>
+          <a:solidFill>
+            <a:schemeClr val="accent2">
+              <a:lumMod val="20000"/>
+              <a:lumOff val="80000"/>
+            </a:schemeClr>
+          </a:solidFill>
+        </p:spPr>
+        <p:txBody>
+          <a:bodyPr wrap="square" rtlCol="0">
+            <a:spAutoFit/>
+          </a:bodyPr>
+          <a:lstStyle/>
+          <a:p>
+            <a:r>
+              <a:rPr lang="de-DE" sz="1200" b="1" dirty="0"/>
+              <a:t>BODY-REGION-Keywords</a:t>
+            </a:r>
+            <a:endParaRPr lang="de-AT" sz="1200" b="1" dirty="0"/>
+          </a:p>
+        </p:txBody>
+      </p:sp>
+      <p:sp>
+        <p:nvSpPr>
+          <p:cNvPr id="45" name="Textfeld 4">
+            <a:extLst>
+              <a:ext uri="{FF2B5EF4-FFF2-40B4-BE49-F238E27FC236}">
+                <a16:creationId xmlns:a16="http://schemas.microsoft.com/office/drawing/2014/main" id="{509122E1-3411-4D2A-9E8C-28BDA3C3C32D}"/>
+              </a:ext>
+            </a:extLst>
+          </p:cNvPr>
+          <p:cNvSpPr txBox="1"/>
+          <p:nvPr/>
+        </p:nvSpPr>
+        <p:spPr>
+          <a:xfrm>
+            <a:off x="4855734" y="2129434"/>
+            <a:ext cx="348175" cy="276999"/>
+          </a:xfrm>
+          <a:prstGeom prst="rect">
+            <a:avLst/>
+          </a:prstGeom>
+          <a:solidFill>
+            <a:schemeClr val="accent2">
+              <a:lumMod val="20000"/>
+              <a:lumOff val="80000"/>
+            </a:schemeClr>
+          </a:solidFill>
+          <a:ln>
+            <a:noFill/>
+          </a:ln>
+        </p:spPr>
+        <p:txBody>
+          <a:bodyPr wrap="square" rtlCol="0">
+            <a:spAutoFit/>
+          </a:bodyPr>
+          <a:lstStyle/>
+          <a:p>
+            <a:endParaRPr lang="de-AT" sz="1200" b="1" dirty="0"/>
+          </a:p>
+        </p:txBody>
+      </p:sp>
+      <p:sp>
+        <p:nvSpPr>
+          <p:cNvPr id="46" name="Textfeld 4">
+            <a:extLst>
+              <a:ext uri="{FF2B5EF4-FFF2-40B4-BE49-F238E27FC236}">
+                <a16:creationId xmlns:a16="http://schemas.microsoft.com/office/drawing/2014/main" id="{D0D4E4EB-3138-4777-9FEA-8BA452B1CB00}"/>
+              </a:ext>
+            </a:extLst>
+          </p:cNvPr>
+          <p:cNvSpPr txBox="1"/>
+          <p:nvPr/>
+        </p:nvSpPr>
+        <p:spPr>
+          <a:xfrm>
+            <a:off x="5273988" y="2133568"/>
+            <a:ext cx="2960914" cy="276999"/>
+          </a:xfrm>
+          <a:prstGeom prst="rect">
+            <a:avLst/>
+          </a:prstGeom>
+          <a:noFill/>
+          <a:ln>
+            <a:noFill/>
+          </a:ln>
+        </p:spPr>
+        <p:txBody>
+          <a:bodyPr wrap="square" rtlCol="0">
+            <a:spAutoFit/>
+          </a:bodyPr>
+          <a:lstStyle/>
+          <a:p>
+            <a:r>
+              <a:rPr lang="de-DE" sz="1200" b="1" dirty="0"/>
+              <a:t>Sub-</a:t>
+            </a:r>
+            <a:r>
+              <a:rPr lang="de-DE" sz="1200" b="1" dirty="0" err="1"/>
+              <a:t>includes</a:t>
+            </a:r>
+            <a:r>
+              <a:rPr lang="de-DE" sz="1200" b="1" dirty="0"/>
+              <a:t> </a:t>
+            </a:r>
+            <a:r>
+              <a:rPr lang="de-DE" sz="1200" b="1" dirty="0" err="1"/>
+              <a:t>of</a:t>
+            </a:r>
+            <a:r>
+              <a:rPr lang="de-DE" sz="1200" b="1" dirty="0"/>
+              <a:t> Body </a:t>
+            </a:r>
+            <a:r>
+              <a:rPr lang="de-DE" sz="1200" b="1" dirty="0" err="1"/>
+              <a:t>Regions</a:t>
+            </a:r>
+            <a:endParaRPr lang="de-AT" sz="1200" b="1" dirty="0"/>
+          </a:p>
+        </p:txBody>
+      </p:sp>
+      <p:sp>
+        <p:nvSpPr>
+          <p:cNvPr id="47" name="Textfeld 4">
+            <a:extLst>
+              <a:ext uri="{FF2B5EF4-FFF2-40B4-BE49-F238E27FC236}">
+                <a16:creationId xmlns:a16="http://schemas.microsoft.com/office/drawing/2014/main" id="{1A74E574-4A41-4AED-9658-34E7DA0C8131}"/>
+              </a:ext>
+            </a:extLst>
+          </p:cNvPr>
+          <p:cNvSpPr txBox="1"/>
+          <p:nvPr/>
+        </p:nvSpPr>
+        <p:spPr>
+          <a:xfrm>
+            <a:off x="990921" y="1263496"/>
+            <a:ext cx="2960914" cy="276999"/>
+          </a:xfrm>
+          <a:prstGeom prst="rect">
+            <a:avLst/>
+          </a:prstGeom>
+          <a:solidFill>
+            <a:schemeClr val="tx2">
+              <a:lumMod val="20000"/>
+              <a:lumOff val="80000"/>
+            </a:schemeClr>
+          </a:solidFill>
+          <a:ln>
+            <a:noFill/>
+          </a:ln>
+        </p:spPr>
+        <p:txBody>
+          <a:bodyPr wrap="square" rtlCol="0">
+            <a:spAutoFit/>
+          </a:bodyPr>
+          <a:lstStyle/>
+          <a:p>
+            <a:r>
+              <a:rPr lang="de-DE" sz="1175" b="1" dirty="0"/>
+              <a:t>Nodes</a:t>
+            </a:r>
+            <a:endParaRPr lang="de-AT" sz="1175" b="1" dirty="0"/>
+          </a:p>
+        </p:txBody>
+      </p:sp>
+    </p:spTree>
+    <p:extLst>
+      <p:ext uri="{BB962C8B-B14F-4D97-AF65-F5344CB8AC3E}">
+        <p14:creationId xmlns:p14="http://schemas.microsoft.com/office/powerpoint/2010/main" val="2067368135"/>
+      </p:ext>
+    </p:extLst>
+  </p:cSld>
+  <p:clrMapOvr>
+    <a:masterClrMapping/>
+  </p:clrMapOvr>
+</p:sld>
+</file>
+
+<file path=ppt/slides/slide7.xml><?xml version="1.0" encoding="utf-8"?>
 <p:sld xmlns:a="http://schemas.openxmlformats.org/drawingml/2006/main" xmlns:r="http://schemas.openxmlformats.org/officeDocument/2006/relationships" xmlns:p="http://schemas.openxmlformats.org/presentationml/2006/main">
   <p:cSld>
     <p:spTree>
@@ -14831,21 +16700,6 @@
 </file>
 
 <file path=customXml/item1.xml><?xml version="1.0" encoding="utf-8"?>
-<?mso-contentType ?>
-<FormTemplates xmlns="http://schemas.microsoft.com/sharepoint/v3/contenttype/forms">
-  <Display>DocumentLibraryForm</Display>
-  <Edit>DocumentLibraryForm</Edit>
-  <New>DocumentLibraryForm</New>
-</FormTemplates>
-</file>
-
-<file path=customXml/item2.xml><?xml version="1.0" encoding="utf-8"?>
-<p:properties xmlns:p="http://schemas.microsoft.com/office/2006/metadata/properties" xmlns:xsi="http://www.w3.org/2001/XMLSchema-instance" xmlns:pc="http://schemas.microsoft.com/office/infopath/2007/PartnerControls">
-  <documentManagement/>
-</p:properties>
-</file>
-
-<file path=customXml/item3.xml><?xml version="1.0" encoding="utf-8"?>
 <ct:contentTypeSchema xmlns:ct="http://schemas.microsoft.com/office/2006/metadata/contentType" xmlns:ma="http://schemas.microsoft.com/office/2006/metadata/properties/metaAttributes" ct:_="" ma:_="" ma:contentTypeName="Document" ma:contentTypeID="0x010100DD7F3C29C5ECC6419955DC7AC5DB0101" ma:contentTypeVersion="5" ma:contentTypeDescription="Create a new document." ma:contentTypeScope="" ma:versionID="d69ec90127bea7f8a3a422162903c404">
   <xsd:schema xmlns:xsd="http://www.w3.org/2001/XMLSchema" xmlns:xs="http://www.w3.org/2001/XMLSchema" xmlns:p="http://schemas.microsoft.com/office/2006/metadata/properties" xmlns:ns2="5c3c24e0-2f18-4ed3-98cf-0281af881984" targetNamespace="http://schemas.microsoft.com/office/2006/metadata/properties" ma:root="true" ma:fieldsID="d744f8cbcf0b7a5f9a47a8202afbc3cb" ns2:_="">
     <xsd:import namespace="5c3c24e0-2f18-4ed3-98cf-0281af881984"/>
@@ -14997,10 +16851,35 @@
 </ct:contentTypeSchema>
 </file>
 
+<file path=customXml/item2.xml><?xml version="1.0" encoding="utf-8"?>
+<p:properties xmlns:p="http://schemas.microsoft.com/office/2006/metadata/properties" xmlns:xsi="http://www.w3.org/2001/XMLSchema-instance" xmlns:pc="http://schemas.microsoft.com/office/infopath/2007/PartnerControls">
+  <documentManagement/>
+</p:properties>
+</file>
+
+<file path=customXml/item3.xml><?xml version="1.0" encoding="utf-8"?>
+<?mso-contentType ?>
+<FormTemplates xmlns="http://schemas.microsoft.com/sharepoint/v3/contenttype/forms">
+  <Display>DocumentLibraryForm</Display>
+  <Edit>DocumentLibraryForm</Edit>
+  <New>DocumentLibraryForm</New>
+</FormTemplates>
+</file>
+
 <file path=customXml/itemProps1.xml><?xml version="1.0" encoding="utf-8"?>
-<ds:datastoreItem xmlns:ds="http://schemas.openxmlformats.org/officeDocument/2006/customXml" ds:itemID="{2D52F603-6639-4510-8E33-A6088EE0A700}">
+<ds:datastoreItem xmlns:ds="http://schemas.openxmlformats.org/officeDocument/2006/customXml" ds:itemID="{993F4F67-72AC-424E-A1EF-B76BB5EA500B}">
   <ds:schemaRefs>
-    <ds:schemaRef ds:uri="http://schemas.microsoft.com/sharepoint/v3/contenttype/forms"/>
+    <ds:schemaRef ds:uri="http://schemas.microsoft.com/office/2006/metadata/contentType"/>
+    <ds:schemaRef ds:uri="http://schemas.microsoft.com/office/2006/metadata/properties/metaAttributes"/>
+    <ds:schemaRef ds:uri="http://www.w3.org/2001/XMLSchema"/>
+    <ds:schemaRef ds:uri="http://schemas.microsoft.com/office/2006/metadata/properties"/>
+    <ds:schemaRef ds:uri="5c3c24e0-2f18-4ed3-98cf-0281af881984"/>
+    <ds:schemaRef ds:uri="http://schemas.microsoft.com/office/2006/documentManagement/types"/>
+    <ds:schemaRef ds:uri="http://schemas.microsoft.com/office/infopath/2007/PartnerControls"/>
+    <ds:schemaRef ds:uri="http://schemas.openxmlformats.org/package/2006/metadata/core-properties"/>
+    <ds:schemaRef ds:uri="http://purl.org/dc/elements/1.1/"/>
+    <ds:schemaRef ds:uri="http://purl.org/dc/terms/"/>
+    <ds:schemaRef ds:uri="http://schemas.microsoft.com/internal/obd"/>
   </ds:schemaRefs>
 </ds:datastoreItem>
 </file>
@@ -15022,19 +16901,9 @@
 </file>
 
 <file path=customXml/itemProps3.xml><?xml version="1.0" encoding="utf-8"?>
-<ds:datastoreItem xmlns:ds="http://schemas.openxmlformats.org/officeDocument/2006/customXml" ds:itemID="{993F4F67-72AC-424E-A1EF-B76BB5EA500B}">
+<ds:datastoreItem xmlns:ds="http://schemas.openxmlformats.org/officeDocument/2006/customXml" ds:itemID="{2D52F603-6639-4510-8E33-A6088EE0A700}">
   <ds:schemaRefs>
-    <ds:schemaRef ds:uri="http://schemas.microsoft.com/office/2006/metadata/contentType"/>
-    <ds:schemaRef ds:uri="http://schemas.microsoft.com/office/2006/metadata/properties/metaAttributes"/>
-    <ds:schemaRef ds:uri="http://www.w3.org/2001/XMLSchema"/>
-    <ds:schemaRef ds:uri="http://schemas.microsoft.com/office/2006/metadata/properties"/>
-    <ds:schemaRef ds:uri="5c3c24e0-2f18-4ed3-98cf-0281af881984"/>
-    <ds:schemaRef ds:uri="http://schemas.microsoft.com/office/2006/documentManagement/types"/>
-    <ds:schemaRef ds:uri="http://schemas.microsoft.com/office/infopath/2007/PartnerControls"/>
-    <ds:schemaRef ds:uri="http://schemas.openxmlformats.org/package/2006/metadata/core-properties"/>
-    <ds:schemaRef ds:uri="http://purl.org/dc/elements/1.1/"/>
-    <ds:schemaRef ds:uri="http://purl.org/dc/terms/"/>
-    <ds:schemaRef ds:uri="http://schemas.microsoft.com/internal/obd"/>
+    <ds:schemaRef ds:uri="http://schemas.microsoft.com/sharepoint/v3/contenttype/forms"/>
   </ds:schemaRefs>
 </ds:datastoreItem>
 </file>
</xml_diff>